<commit_message>
update robotstxt in images
</commit_message>
<xml_diff>
--- a/images/Images_pptx.pptx
+++ b/images/Images_pptx.pptx
@@ -204,7 +204,7 @@
           <a:p>
             <a:fld id="{9E9AA8DD-40B9-448A-89CB-16B73E88C72D}" type="datetimeFigureOut">
               <a:rPr lang="en-GB" smtClean="0"/>
-              <a:t>26/09/2018</a:t>
+              <a:t>27/09/2018</a:t>
             </a:fld>
             <a:endParaRPr lang="en-GB"/>
           </a:p>
@@ -722,7 +722,7 @@
           <a:p>
             <a:fld id="{3E2FC8C7-FF0E-4FCF-804D-A269A90AB1E3}" type="datetimeFigureOut">
               <a:rPr lang="en-GB" smtClean="0"/>
-              <a:t>26/09/2018</a:t>
+              <a:t>27/09/2018</a:t>
             </a:fld>
             <a:endParaRPr lang="en-GB"/>
           </a:p>
@@ -922,7 +922,7 @@
           <a:p>
             <a:fld id="{3E2FC8C7-FF0E-4FCF-804D-A269A90AB1E3}" type="datetimeFigureOut">
               <a:rPr lang="en-GB" smtClean="0"/>
-              <a:t>26/09/2018</a:t>
+              <a:t>27/09/2018</a:t>
             </a:fld>
             <a:endParaRPr lang="en-GB"/>
           </a:p>
@@ -1132,7 +1132,7 @@
           <a:p>
             <a:fld id="{3E2FC8C7-FF0E-4FCF-804D-A269A90AB1E3}" type="datetimeFigureOut">
               <a:rPr lang="en-GB" smtClean="0"/>
-              <a:t>26/09/2018</a:t>
+              <a:t>27/09/2018</a:t>
             </a:fld>
             <a:endParaRPr lang="en-GB"/>
           </a:p>
@@ -1627,7 +1627,7 @@
           <a:p>
             <a:fld id="{3E2FC8C7-FF0E-4FCF-804D-A269A90AB1E3}" type="datetimeFigureOut">
               <a:rPr lang="en-GB" smtClean="0"/>
-              <a:t>26/09/2018</a:t>
+              <a:t>27/09/2018</a:t>
             </a:fld>
             <a:endParaRPr lang="en-GB"/>
           </a:p>
@@ -1903,7 +1903,7 @@
           <a:p>
             <a:fld id="{3E2FC8C7-FF0E-4FCF-804D-A269A90AB1E3}" type="datetimeFigureOut">
               <a:rPr lang="en-GB" smtClean="0"/>
-              <a:t>26/09/2018</a:t>
+              <a:t>27/09/2018</a:t>
             </a:fld>
             <a:endParaRPr lang="en-GB"/>
           </a:p>
@@ -2171,7 +2171,7 @@
           <a:p>
             <a:fld id="{3E2FC8C7-FF0E-4FCF-804D-A269A90AB1E3}" type="datetimeFigureOut">
               <a:rPr lang="en-GB" smtClean="0"/>
-              <a:t>26/09/2018</a:t>
+              <a:t>27/09/2018</a:t>
             </a:fld>
             <a:endParaRPr lang="en-GB"/>
           </a:p>
@@ -2586,7 +2586,7 @@
           <a:p>
             <a:fld id="{3E2FC8C7-FF0E-4FCF-804D-A269A90AB1E3}" type="datetimeFigureOut">
               <a:rPr lang="en-GB" smtClean="0"/>
-              <a:t>26/09/2018</a:t>
+              <a:t>27/09/2018</a:t>
             </a:fld>
             <a:endParaRPr lang="en-GB"/>
           </a:p>
@@ -2728,7 +2728,7 @@
           <a:p>
             <a:fld id="{3E2FC8C7-FF0E-4FCF-804D-A269A90AB1E3}" type="datetimeFigureOut">
               <a:rPr lang="en-GB" smtClean="0"/>
-              <a:t>26/09/2018</a:t>
+              <a:t>27/09/2018</a:t>
             </a:fld>
             <a:endParaRPr lang="en-GB"/>
           </a:p>
@@ -2841,7 +2841,7 @@
           <a:p>
             <a:fld id="{3E2FC8C7-FF0E-4FCF-804D-A269A90AB1E3}" type="datetimeFigureOut">
               <a:rPr lang="en-GB" smtClean="0"/>
-              <a:t>26/09/2018</a:t>
+              <a:t>27/09/2018</a:t>
             </a:fld>
             <a:endParaRPr lang="en-GB"/>
           </a:p>
@@ -3154,7 +3154,7 @@
           <a:p>
             <a:fld id="{3E2FC8C7-FF0E-4FCF-804D-A269A90AB1E3}" type="datetimeFigureOut">
               <a:rPr lang="en-GB" smtClean="0"/>
-              <a:t>26/09/2018</a:t>
+              <a:t>27/09/2018</a:t>
             </a:fld>
             <a:endParaRPr lang="en-GB"/>
           </a:p>
@@ -3443,7 +3443,7 @@
           <a:p>
             <a:fld id="{3E2FC8C7-FF0E-4FCF-804D-A269A90AB1E3}" type="datetimeFigureOut">
               <a:rPr lang="en-GB" smtClean="0"/>
-              <a:t>26/09/2018</a:t>
+              <a:t>27/09/2018</a:t>
             </a:fld>
             <a:endParaRPr lang="en-GB"/>
           </a:p>
@@ -3686,7 +3686,7 @@
           <a:p>
             <a:fld id="{3E2FC8C7-FF0E-4FCF-804D-A269A90AB1E3}" type="datetimeFigureOut">
               <a:rPr lang="en-GB" smtClean="0"/>
-              <a:t>26/09/2018</a:t>
+              <a:t>27/09/2018</a:t>
             </a:fld>
             <a:endParaRPr lang="en-GB"/>
           </a:p>
@@ -7083,9 +7083,9 @@
         <p:grpSpPr>
           <a:xfrm>
             <a:off x="626084" y="1443976"/>
-            <a:ext cx="11286996" cy="3124572"/>
+            <a:ext cx="11286996" cy="3432348"/>
             <a:chOff x="626083" y="771331"/>
-            <a:chExt cx="11286996" cy="3124572"/>
+            <a:chExt cx="11286996" cy="3432348"/>
           </a:xfrm>
         </p:grpSpPr>
         <p:grpSp>
@@ -7272,7 +7272,7 @@
           <p:spPr>
             <a:xfrm>
               <a:off x="626083" y="3064906"/>
-              <a:ext cx="3296373" cy="830997"/>
+              <a:ext cx="3296373" cy="1138773"/>
             </a:xfrm>
             <a:prstGeom prst="rect">
               <a:avLst/>
@@ -7309,6 +7309,20 @@
                   <a:latin typeface="Bahnschrift SemiBold" panose="020B0502040204020203" pitchFamily="34" charset="0"/>
                 </a:rPr>
                 <a:t>- URL construction</a:t>
+              </a:r>
+            </a:p>
+            <a:p>
+              <a:r>
+                <a:rPr lang="en-GB" sz="2000" b="1" dirty="0">
+                  <a:solidFill>
+                    <a:schemeClr val="tx1">
+                      <a:lumMod val="50000"/>
+                      <a:lumOff val="50000"/>
+                    </a:schemeClr>
+                  </a:solidFill>
+                  <a:latin typeface="Bahnschrift SemiBold" panose="020B0502040204020203" pitchFamily="34" charset="0"/>
+                </a:rPr>
+                <a:t>- Allowed to scrape?</a:t>
               </a:r>
             </a:p>
           </p:txBody>
@@ -8065,9 +8079,9 @@
         <p:grpSpPr>
           <a:xfrm>
             <a:off x="626084" y="1443976"/>
-            <a:ext cx="11286996" cy="3124572"/>
+            <a:ext cx="11286996" cy="3432348"/>
             <a:chOff x="626083" y="771331"/>
-            <a:chExt cx="11286996" cy="3124572"/>
+            <a:chExt cx="11286996" cy="3432348"/>
           </a:xfrm>
         </p:grpSpPr>
         <p:grpSp>
@@ -8254,7 +8268,7 @@
           <p:spPr>
             <a:xfrm>
               <a:off x="626083" y="3064906"/>
-              <a:ext cx="3296373" cy="830997"/>
+              <a:ext cx="3296373" cy="1138773"/>
             </a:xfrm>
             <a:prstGeom prst="rect">
               <a:avLst/>
@@ -8291,6 +8305,20 @@
                   <a:latin typeface="Bahnschrift SemiBold" panose="020B0502040204020203" pitchFamily="34" charset="0"/>
                 </a:rPr>
                 <a:t>- URL construction</a:t>
+              </a:r>
+            </a:p>
+            <a:p>
+              <a:r>
+                <a:rPr lang="en-GB" sz="2000" b="1" dirty="0">
+                  <a:solidFill>
+                    <a:schemeClr val="tx1">
+                      <a:lumMod val="50000"/>
+                      <a:lumOff val="50000"/>
+                    </a:schemeClr>
+                  </a:solidFill>
+                  <a:latin typeface="Bahnschrift SemiBold" panose="020B0502040204020203" pitchFamily="34" charset="0"/>
+                </a:rPr>
+                <a:t>- Allowed to scrape?</a:t>
               </a:r>
             </a:p>
           </p:txBody>
@@ -9017,7 +9045,7 @@
         <p:spPr>
           <a:xfrm>
             <a:off x="626084" y="5370133"/>
-            <a:ext cx="3296373" cy="584775"/>
+            <a:ext cx="3551500" cy="1077218"/>
           </a:xfrm>
           <a:prstGeom prst="rect">
             <a:avLst/>
@@ -9087,6 +9115,70 @@
               </a:rPr>
               <a:t>()</a:t>
             </a:r>
+          </a:p>
+          <a:p>
+            <a:endParaRPr lang="en-GB" sz="1600" dirty="0">
+              <a:solidFill>
+                <a:schemeClr val="accent2">
+                  <a:lumMod val="75000"/>
+                </a:schemeClr>
+              </a:solidFill>
+              <a:latin typeface="Lucida Console" panose="020B0609040504020204" pitchFamily="49" charset="0"/>
+            </a:endParaRPr>
+          </a:p>
+          <a:p>
+            <a:r>
+              <a:rPr lang="fr-BE" sz="1600" dirty="0" err="1">
+                <a:solidFill>
+                  <a:schemeClr val="accent2">
+                    <a:lumMod val="75000"/>
+                  </a:schemeClr>
+                </a:solidFill>
+                <a:latin typeface="Lucida Console" panose="020B0609040504020204" pitchFamily="49" charset="0"/>
+              </a:rPr>
+              <a:t>robotstxt</a:t>
+            </a:r>
+            <a:r>
+              <a:rPr lang="fr-BE" sz="1600" dirty="0">
+                <a:solidFill>
+                  <a:schemeClr val="accent2">
+                    <a:lumMod val="75000"/>
+                  </a:schemeClr>
+                </a:solidFill>
+                <a:latin typeface="Lucida Console" panose="020B0609040504020204" pitchFamily="49" charset="0"/>
+              </a:rPr>
+              <a:t>::</a:t>
+            </a:r>
+            <a:r>
+              <a:rPr lang="fr-BE" sz="1600" dirty="0" err="1">
+                <a:solidFill>
+                  <a:schemeClr val="accent2">
+                    <a:lumMod val="75000"/>
+                  </a:schemeClr>
+                </a:solidFill>
+                <a:latin typeface="Lucida Console" panose="020B0609040504020204" pitchFamily="49" charset="0"/>
+              </a:rPr>
+              <a:t>paths_allowed</a:t>
+            </a:r>
+            <a:r>
+              <a:rPr lang="fr-BE" sz="1600" dirty="0">
+                <a:solidFill>
+                  <a:schemeClr val="accent2">
+                    <a:lumMod val="75000"/>
+                  </a:schemeClr>
+                </a:solidFill>
+                <a:latin typeface="Lucida Console" panose="020B0609040504020204" pitchFamily="49" charset="0"/>
+              </a:rPr>
+              <a:t>()</a:t>
+            </a:r>
+            <a:endParaRPr lang="en-GB" sz="1600" dirty="0">
+              <a:solidFill>
+                <a:schemeClr val="accent2">
+                  <a:lumMod val="75000"/>
+                </a:schemeClr>
+              </a:solidFill>
+              <a:latin typeface="Lucida Console" panose="020B0609040504020204" pitchFamily="49" charset="0"/>
+            </a:endParaRPr>
           </a:p>
         </p:txBody>
       </p:sp>
@@ -9308,8 +9400,8 @@
         </p:nvSpPr>
         <p:spPr>
           <a:xfrm>
-            <a:off x="9223545" y="5364280"/>
-            <a:ext cx="3296373" cy="584775"/>
+            <a:off x="9223546" y="5364280"/>
+            <a:ext cx="2689534" cy="830997"/>
           </a:xfrm>
           <a:prstGeom prst="rect">
             <a:avLst/>
@@ -9377,7 +9469,7 @@
                 </a:solidFill>
                 <a:latin typeface="Lucida Console" panose="020B0609040504020204" pitchFamily="49" charset="0"/>
               </a:rPr>
-              <a:t>rvest</a:t>
+              <a:t>Rvest</a:t>
             </a:r>
             <a:r>
               <a:rPr lang="en-GB" sz="1600" dirty="0">
@@ -9399,7 +9491,53 @@
                 </a:solidFill>
                 <a:latin typeface="Lucida Console" panose="020B0609040504020204" pitchFamily="49" charset="0"/>
               </a:rPr>
-              <a:t>html_tables</a:t>
+              <a:t>html_attr</a:t>
+            </a:r>
+            <a:r>
+              <a:rPr lang="en-GB" sz="1600" dirty="0">
+                <a:solidFill>
+                  <a:schemeClr val="accent2">
+                    <a:lumMod val="75000"/>
+                  </a:schemeClr>
+                </a:solidFill>
+                <a:latin typeface="Lucida Console" panose="020B0609040504020204" pitchFamily="49" charset="0"/>
+              </a:rPr>
+              <a:t>()</a:t>
+            </a:r>
+          </a:p>
+          <a:p>
+            <a:r>
+              <a:rPr lang="en-GB" sz="1600" dirty="0" err="1">
+                <a:solidFill>
+                  <a:schemeClr val="accent2">
+                    <a:lumMod val="75000"/>
+                  </a:schemeClr>
+                </a:solidFill>
+                <a:latin typeface="Lucida Console" panose="020B0609040504020204" pitchFamily="49" charset="0"/>
+              </a:rPr>
+              <a:t>rvest</a:t>
+            </a:r>
+            <a:r>
+              <a:rPr lang="en-GB" sz="1600" dirty="0">
+                <a:solidFill>
+                  <a:schemeClr val="accent2">
+                    <a:lumMod val="75000"/>
+                  </a:schemeClr>
+                </a:solidFill>
+                <a:latin typeface="Lucida Console" panose="020B0609040504020204" pitchFamily="49" charset="0"/>
+              </a:rPr>
+              <a:t>::</a:t>
+            </a:r>
+            <a:r>
+              <a:rPr lang="en-GB" sz="1600" dirty="0" err="1">
+                <a:solidFill>
+                  <a:schemeClr val="accent2">
+                    <a:lumMod val="75000"/>
+                  </a:schemeClr>
+                </a:solidFill>
+                <a:latin typeface="Lucida Console" panose="020B0609040504020204" pitchFamily="49" charset="0"/>
+              </a:rPr>
+              <a:t>html_table</a:t>
             </a:r>
             <a:r>
               <a:rPr lang="en-GB" sz="1600" dirty="0">

</xml_diff>